<commit_message>
prepat premier merge 23/12/2020
</commit_message>
<xml_diff>
--- a/ressources/Présentation projet jeux.pptx
+++ b/ressources/Présentation projet jeux.pptx
@@ -9,9 +9,11 @@
     <p:sldId id="257" r:id="rId3"/>
     <p:sldId id="259" r:id="rId4"/>
     <p:sldId id="260" r:id="rId5"/>
-    <p:sldId id="261" r:id="rId6"/>
-    <p:sldId id="262" r:id="rId7"/>
-    <p:sldId id="258" r:id="rId8"/>
+    <p:sldId id="262" r:id="rId6"/>
+    <p:sldId id="261" r:id="rId7"/>
+    <p:sldId id="264" r:id="rId8"/>
+    <p:sldId id="263" r:id="rId9"/>
+    <p:sldId id="258" r:id="rId10"/>
   </p:sldIdLst>
   <p:sldSz cx="12192000" cy="6858000"/>
   <p:notesSz cx="6858000" cy="9144000"/>
@@ -110,6 +112,11 @@
       </a:defRPr>
     </a:lvl9pPr>
   </p:defaultTextStyle>
+  <p:extLst>
+    <p:ext uri="{EFAFB233-063F-42B5-8137-9DF3F51BA10A}">
+      <p15:sldGuideLst xmlns:p15="http://schemas.microsoft.com/office/powerpoint/2012/main"/>
+    </p:ext>
+  </p:extLst>
 </p:presentation>
 </file>
 
@@ -260,7 +267,7 @@
           <a:p>
             <a:fld id="{98609DF4-D06E-4B71-8F19-1FE54C31F599}" type="datetimeFigureOut">
               <a:rPr lang="fr-FR" smtClean="0"/>
-              <a:t>20/11/2020</a:t>
+              <a:t>10/12/2020</a:t>
             </a:fld>
             <a:endParaRPr lang="fr-FR"/>
           </a:p>
@@ -458,7 +465,7 @@
           <a:p>
             <a:fld id="{98609DF4-D06E-4B71-8F19-1FE54C31F599}" type="datetimeFigureOut">
               <a:rPr lang="fr-FR" smtClean="0"/>
-              <a:t>20/11/2020</a:t>
+              <a:t>10/12/2020</a:t>
             </a:fld>
             <a:endParaRPr lang="fr-FR"/>
           </a:p>
@@ -666,7 +673,7 @@
           <a:p>
             <a:fld id="{98609DF4-D06E-4B71-8F19-1FE54C31F599}" type="datetimeFigureOut">
               <a:rPr lang="fr-FR" smtClean="0"/>
-              <a:t>20/11/2020</a:t>
+              <a:t>10/12/2020</a:t>
             </a:fld>
             <a:endParaRPr lang="fr-FR"/>
           </a:p>
@@ -864,7 +871,7 @@
           <a:p>
             <a:fld id="{98609DF4-D06E-4B71-8F19-1FE54C31F599}" type="datetimeFigureOut">
               <a:rPr lang="fr-FR" smtClean="0"/>
-              <a:t>20/11/2020</a:t>
+              <a:t>10/12/2020</a:t>
             </a:fld>
             <a:endParaRPr lang="fr-FR"/>
           </a:p>
@@ -1139,7 +1146,7 @@
           <a:p>
             <a:fld id="{98609DF4-D06E-4B71-8F19-1FE54C31F599}" type="datetimeFigureOut">
               <a:rPr lang="fr-FR" smtClean="0"/>
-              <a:t>20/11/2020</a:t>
+              <a:t>10/12/2020</a:t>
             </a:fld>
             <a:endParaRPr lang="fr-FR"/>
           </a:p>
@@ -1404,7 +1411,7 @@
           <a:p>
             <a:fld id="{98609DF4-D06E-4B71-8F19-1FE54C31F599}" type="datetimeFigureOut">
               <a:rPr lang="fr-FR" smtClean="0"/>
-              <a:t>20/11/2020</a:t>
+              <a:t>10/12/2020</a:t>
             </a:fld>
             <a:endParaRPr lang="fr-FR"/>
           </a:p>
@@ -1816,7 +1823,7 @@
           <a:p>
             <a:fld id="{98609DF4-D06E-4B71-8F19-1FE54C31F599}" type="datetimeFigureOut">
               <a:rPr lang="fr-FR" smtClean="0"/>
-              <a:t>20/11/2020</a:t>
+              <a:t>10/12/2020</a:t>
             </a:fld>
             <a:endParaRPr lang="fr-FR"/>
           </a:p>
@@ -1957,7 +1964,7 @@
           <a:p>
             <a:fld id="{98609DF4-D06E-4B71-8F19-1FE54C31F599}" type="datetimeFigureOut">
               <a:rPr lang="fr-FR" smtClean="0"/>
-              <a:t>20/11/2020</a:t>
+              <a:t>10/12/2020</a:t>
             </a:fld>
             <a:endParaRPr lang="fr-FR"/>
           </a:p>
@@ -2070,7 +2077,7 @@
           <a:p>
             <a:fld id="{98609DF4-D06E-4B71-8F19-1FE54C31F599}" type="datetimeFigureOut">
               <a:rPr lang="fr-FR" smtClean="0"/>
-              <a:t>20/11/2020</a:t>
+              <a:t>10/12/2020</a:t>
             </a:fld>
             <a:endParaRPr lang="fr-FR"/>
           </a:p>
@@ -2381,7 +2388,7 @@
           <a:p>
             <a:fld id="{98609DF4-D06E-4B71-8F19-1FE54C31F599}" type="datetimeFigureOut">
               <a:rPr lang="fr-FR" smtClean="0"/>
-              <a:t>20/11/2020</a:t>
+              <a:t>10/12/2020</a:t>
             </a:fld>
             <a:endParaRPr lang="fr-FR"/>
           </a:p>
@@ -2669,7 +2676,7 @@
           <a:p>
             <a:fld id="{98609DF4-D06E-4B71-8F19-1FE54C31F599}" type="datetimeFigureOut">
               <a:rPr lang="fr-FR" smtClean="0"/>
-              <a:t>20/11/2020</a:t>
+              <a:t>10/12/2020</a:t>
             </a:fld>
             <a:endParaRPr lang="fr-FR"/>
           </a:p>
@@ -2910,7 +2917,7 @@
           <a:p>
             <a:fld id="{98609DF4-D06E-4B71-8F19-1FE54C31F599}" type="datetimeFigureOut">
               <a:rPr lang="fr-FR" smtClean="0"/>
-              <a:t>20/11/2020</a:t>
+              <a:t>10/12/2020</a:t>
             </a:fld>
             <a:endParaRPr lang="fr-FR"/>
           </a:p>
@@ -3503,7 +3510,7 @@
                   </a:schemeClr>
                 </a:solidFill>
               </a:rPr>
-              <a:t>Présentation projet jeux </a:t>
+              <a:t>Présentation projet jeu </a:t>
             </a:r>
           </a:p>
         </p:txBody>
@@ -3613,6 +3620,18 @@
   <p:clrMapOvr>
     <a:overrideClrMapping bg1="dk1" tx1="lt1" bg2="dk2" tx2="lt2" accent1="accent1" accent2="accent2" accent3="accent3" accent4="accent4" accent5="accent5" accent6="accent6" hlink="hlink" folHlink="folHlink"/>
   </p:clrMapOvr>
+  <mc:AlternateContent xmlns:mc="http://schemas.openxmlformats.org/markup-compatibility/2006" xmlns:p159="http://schemas.microsoft.com/office/powerpoint/2015/09/main">
+    <mc:Choice Requires="p159">
+      <p:transition xmlns:p14="http://schemas.microsoft.com/office/powerpoint/2010/main" spd="slow" p14:dur="2000">
+        <p159:morph option="byObject"/>
+      </p:transition>
+    </mc:Choice>
+    <mc:Fallback xmlns="">
+      <p:transition spd="slow">
+        <p:fade/>
+      </p:transition>
+    </mc:Fallback>
+  </mc:AlternateContent>
 </p:sld>
 </file>
 
@@ -3810,7 +3829,7 @@
                   </a:schemeClr>
                 </a:solidFill>
               </a:rPr>
-              <a:t>Description du jeux </a:t>
+              <a:t>Description du jeu </a:t>
             </a:r>
           </a:p>
         </p:txBody>
@@ -3900,11 +3919,183 @@
           <a:p>
             <a:r>
               <a:rPr lang="fr-FR" dirty="0"/>
-              <a:t>Résumé jeux, présentation du studio de développement, présentation de la plateforme du jeux </a:t>
-            </a:r>
-          </a:p>
-        </p:txBody>
-      </p:sp>
+              <a:t>Résumé jeu, présentation du studio de développement, présentation de la plateforme du jeu</a:t>
+            </a:r>
+          </a:p>
+        </p:txBody>
+      </p:sp>
+      <p:pic>
+        <p:nvPicPr>
+          <p:cNvPr id="11" name="Image 10">
+            <a:extLst>
+              <a:ext uri="{FF2B5EF4-FFF2-40B4-BE49-F238E27FC236}">
+                <a16:creationId xmlns:a16="http://schemas.microsoft.com/office/drawing/2014/main" id="{04F9CE29-148E-4B3A-B8DB-EBC96104D70D}"/>
+              </a:ext>
+            </a:extLst>
+          </p:cNvPr>
+          <p:cNvPicPr>
+            <a:picLocks noChangeAspect="1"/>
+          </p:cNvPicPr>
+          <p:nvPr/>
+        </p:nvPicPr>
+        <p:blipFill>
+          <a:blip r:embed="rId3">
+            <a:extLst>
+              <a:ext uri="{28A0092B-C50C-407E-A947-70E740481C1C}">
+                <a14:useLocalDpi xmlns:a14="http://schemas.microsoft.com/office/drawing/2010/main" val="0"/>
+              </a:ext>
+            </a:extLst>
+          </a:blip>
+          <a:stretch>
+            <a:fillRect/>
+          </a:stretch>
+        </p:blipFill>
+        <p:spPr>
+          <a:xfrm>
+            <a:off x="253797" y="158139"/>
+            <a:ext cx="1781453" cy="2185249"/>
+          </a:xfrm>
+          <a:prstGeom prst="rect">
+            <a:avLst/>
+          </a:prstGeom>
+          <a:ln w="38100" cap="sq">
+            <a:solidFill>
+              <a:srgbClr val="000000"/>
+            </a:solidFill>
+            <a:prstDash val="solid"/>
+            <a:miter lim="800000"/>
+          </a:ln>
+          <a:effectLst>
+            <a:outerShdw blurRad="50800" dist="38100" dir="2700000" algn="tl" rotWithShape="0">
+              <a:srgbClr val="000000">
+                <a:alpha val="43000"/>
+              </a:srgbClr>
+            </a:outerShdw>
+          </a:effectLst>
+        </p:spPr>
+      </p:pic>
+      <p:pic>
+        <p:nvPicPr>
+          <p:cNvPr id="14" name="Image 13" descr="Une image contenant personne&#10;&#10;Description générée automatiquement">
+            <a:extLst>
+              <a:ext uri="{FF2B5EF4-FFF2-40B4-BE49-F238E27FC236}">
+                <a16:creationId xmlns:a16="http://schemas.microsoft.com/office/drawing/2014/main" id="{04E41B3B-2AE7-497E-BEF6-CA8532B97934}"/>
+              </a:ext>
+            </a:extLst>
+          </p:cNvPr>
+          <p:cNvPicPr>
+            <a:picLocks noChangeAspect="1"/>
+          </p:cNvPicPr>
+          <p:nvPr/>
+        </p:nvPicPr>
+        <p:blipFill>
+          <a:blip r:embed="rId4">
+            <a:extLst>
+              <a:ext uri="{28A0092B-C50C-407E-A947-70E740481C1C}">
+                <a14:useLocalDpi xmlns:a14="http://schemas.microsoft.com/office/drawing/2010/main" val="0"/>
+              </a:ext>
+            </a:extLst>
+          </a:blip>
+          <a:stretch>
+            <a:fillRect/>
+          </a:stretch>
+        </p:blipFill>
+        <p:spPr>
+          <a:xfrm>
+            <a:off x="6851009" y="588659"/>
+            <a:ext cx="4876800" cy="4333875"/>
+          </a:xfrm>
+          <a:prstGeom prst="rect">
+            <a:avLst/>
+          </a:prstGeom>
+        </p:spPr>
+      </p:pic>
+      <p:pic>
+        <p:nvPicPr>
+          <p:cNvPr id="16" name="Image 15" descr="Une image contenant personne, sculpture&#10;&#10;Description générée automatiquement">
+            <a:extLst>
+              <a:ext uri="{FF2B5EF4-FFF2-40B4-BE49-F238E27FC236}">
+                <a16:creationId xmlns:a16="http://schemas.microsoft.com/office/drawing/2014/main" id="{51E0C5C1-F6B0-45BB-8D95-C226757326BD}"/>
+              </a:ext>
+            </a:extLst>
+          </p:cNvPr>
+          <p:cNvPicPr>
+            <a:picLocks noChangeAspect="1"/>
+          </p:cNvPicPr>
+          <p:nvPr/>
+        </p:nvPicPr>
+        <p:blipFill>
+          <a:blip r:embed="rId5">
+            <a:extLst>
+              <a:ext uri="{28A0092B-C50C-407E-A947-70E740481C1C}">
+                <a14:useLocalDpi xmlns:a14="http://schemas.microsoft.com/office/drawing/2010/main" val="0"/>
+              </a:ext>
+            </a:extLst>
+          </a:blip>
+          <a:stretch>
+            <a:fillRect/>
+          </a:stretch>
+        </p:blipFill>
+        <p:spPr>
+          <a:xfrm>
+            <a:off x="3781547" y="2006301"/>
+            <a:ext cx="1668371" cy="2312722"/>
+          </a:xfrm>
+          <a:prstGeom prst="rect">
+            <a:avLst/>
+          </a:prstGeom>
+        </p:spPr>
+      </p:pic>
+      <p:pic>
+        <p:nvPicPr>
+          <p:cNvPr id="22" name="Image 21">
+            <a:extLst>
+              <a:ext uri="{FF2B5EF4-FFF2-40B4-BE49-F238E27FC236}">
+                <a16:creationId xmlns:a16="http://schemas.microsoft.com/office/drawing/2014/main" id="{FED11327-75BA-440B-B5A9-C6F75EE2418A}"/>
+              </a:ext>
+            </a:extLst>
+          </p:cNvPr>
+          <p:cNvPicPr>
+            <a:picLocks noChangeAspect="1"/>
+          </p:cNvPicPr>
+          <p:nvPr/>
+        </p:nvPicPr>
+        <p:blipFill>
+          <a:blip r:embed="rId6">
+            <a:extLst>
+              <a:ext uri="{28A0092B-C50C-407E-A947-70E740481C1C}">
+                <a14:useLocalDpi xmlns:a14="http://schemas.microsoft.com/office/drawing/2010/main" val="0"/>
+              </a:ext>
+            </a:extLst>
+          </a:blip>
+          <a:stretch>
+            <a:fillRect/>
+          </a:stretch>
+        </p:blipFill>
+        <p:spPr>
+          <a:xfrm>
+            <a:off x="253797" y="2605516"/>
+            <a:ext cx="2731561" cy="2185249"/>
+          </a:xfrm>
+          <a:prstGeom prst="rect">
+            <a:avLst/>
+          </a:prstGeom>
+          <a:ln w="38100" cap="sq">
+            <a:solidFill>
+              <a:srgbClr val="000000"/>
+            </a:solidFill>
+            <a:prstDash val="solid"/>
+            <a:miter lim="800000"/>
+          </a:ln>
+          <a:effectLst>
+            <a:outerShdw blurRad="50800" dist="38100" dir="2700000" algn="tl" rotWithShape="0">
+              <a:srgbClr val="000000">
+                <a:alpha val="43000"/>
+              </a:srgbClr>
+            </a:outerShdw>
+          </a:effectLst>
+        </p:spPr>
+      </p:pic>
     </p:spTree>
     <p:extLst>
       <p:ext uri="{BB962C8B-B14F-4D97-AF65-F5344CB8AC3E}">
@@ -3915,6 +4106,18 @@
   <p:clrMapOvr>
     <a:overrideClrMapping bg1="dk1" tx1="lt1" bg2="dk2" tx2="lt2" accent1="accent1" accent2="accent2" accent3="accent3" accent4="accent4" accent5="accent5" accent6="accent6" hlink="hlink" folHlink="folHlink"/>
   </p:clrMapOvr>
+  <mc:AlternateContent xmlns:mc="http://schemas.openxmlformats.org/markup-compatibility/2006" xmlns:p14="http://schemas.microsoft.com/office/powerpoint/2010/main">
+    <mc:Choice Requires="p14">
+      <p:transition spd="med" p14:dur="700">
+        <p:fade/>
+      </p:transition>
+    </mc:Choice>
+    <mc:Fallback xmlns="">
+      <p:transition spd="med">
+        <p:fade/>
+      </p:transition>
+    </mc:Fallback>
+  </mc:AlternateContent>
 </p:sld>
 </file>
 
@@ -4112,7 +4315,7 @@
                   </a:schemeClr>
                 </a:solidFill>
               </a:rPr>
-              <a:t>Descriptive des personages </a:t>
+              <a:t>Descriptif des personnages </a:t>
             </a:r>
           </a:p>
         </p:txBody>
@@ -4202,7 +4405,191 @@
           <a:p>
             <a:r>
               <a:rPr lang="fr-FR" dirty="0"/>
-              <a:t>Présentation des deux personnage jouable / présentation des ennemie</a:t>
+              <a:t>Présentation des deux personnages jouables / présentation des ennemis</a:t>
+            </a:r>
+          </a:p>
+        </p:txBody>
+      </p:sp>
+      <p:pic>
+        <p:nvPicPr>
+          <p:cNvPr id="6" name="Image 5" descr="Une image contenant personne, homme&#10;&#10;Description générée automatiquement">
+            <a:extLst>
+              <a:ext uri="{FF2B5EF4-FFF2-40B4-BE49-F238E27FC236}">
+                <a16:creationId xmlns:a16="http://schemas.microsoft.com/office/drawing/2014/main" id="{64DAC1A7-0406-4FF3-AF5B-8AF016E36DCB}"/>
+              </a:ext>
+            </a:extLst>
+          </p:cNvPr>
+          <p:cNvPicPr>
+            <a:picLocks noChangeAspect="1"/>
+          </p:cNvPicPr>
+          <p:nvPr/>
+        </p:nvPicPr>
+        <p:blipFill>
+          <a:blip r:embed="rId3">
+            <a:extLst>
+              <a:ext uri="{28A0092B-C50C-407E-A947-70E740481C1C}">
+                <a14:useLocalDpi xmlns:a14="http://schemas.microsoft.com/office/drawing/2010/main" val="0"/>
+              </a:ext>
+            </a:extLst>
+          </a:blip>
+          <a:stretch>
+            <a:fillRect/>
+          </a:stretch>
+        </p:blipFill>
+        <p:spPr>
+          <a:xfrm>
+            <a:off x="9197150" y="2084848"/>
+            <a:ext cx="1996559" cy="2807192"/>
+          </a:xfrm>
+          <a:prstGeom prst="rect">
+            <a:avLst/>
+          </a:prstGeom>
+        </p:spPr>
+      </p:pic>
+      <p:pic>
+        <p:nvPicPr>
+          <p:cNvPr id="8" name="Image 7" descr="Une image contenant personne, sombre, guitare, instrument à cordes&#10;&#10;Description générée automatiquement">
+            <a:extLst>
+              <a:ext uri="{FF2B5EF4-FFF2-40B4-BE49-F238E27FC236}">
+                <a16:creationId xmlns:a16="http://schemas.microsoft.com/office/drawing/2014/main" id="{19A60C66-C6DF-460F-B6F2-4C7617D4DEA5}"/>
+              </a:ext>
+            </a:extLst>
+          </p:cNvPr>
+          <p:cNvPicPr>
+            <a:picLocks noChangeAspect="1"/>
+          </p:cNvPicPr>
+          <p:nvPr/>
+        </p:nvPicPr>
+        <p:blipFill>
+          <a:blip r:embed="rId4">
+            <a:extLst>
+              <a:ext uri="{28A0092B-C50C-407E-A947-70E740481C1C}">
+                <a14:useLocalDpi xmlns:a14="http://schemas.microsoft.com/office/drawing/2010/main" val="0"/>
+              </a:ext>
+            </a:extLst>
+          </a:blip>
+          <a:stretch>
+            <a:fillRect/>
+          </a:stretch>
+        </p:blipFill>
+        <p:spPr>
+          <a:xfrm>
+            <a:off x="7158776" y="2272870"/>
+            <a:ext cx="2080207" cy="2619170"/>
+          </a:xfrm>
+          <a:prstGeom prst="rect">
+            <a:avLst/>
+          </a:prstGeom>
+        </p:spPr>
+      </p:pic>
+      <p:pic>
+        <p:nvPicPr>
+          <p:cNvPr id="11" name="Image 10">
+            <a:extLst>
+              <a:ext uri="{FF2B5EF4-FFF2-40B4-BE49-F238E27FC236}">
+                <a16:creationId xmlns:a16="http://schemas.microsoft.com/office/drawing/2014/main" id="{9A805A63-0132-4319-B99E-6EEF358A8675}"/>
+              </a:ext>
+            </a:extLst>
+          </p:cNvPr>
+          <p:cNvPicPr>
+            <a:picLocks noChangeAspect="1"/>
+          </p:cNvPicPr>
+          <p:nvPr/>
+        </p:nvPicPr>
+        <p:blipFill>
+          <a:blip r:embed="rId5">
+            <a:extLst>
+              <a:ext uri="{28A0092B-C50C-407E-A947-70E740481C1C}">
+                <a14:useLocalDpi xmlns:a14="http://schemas.microsoft.com/office/drawing/2010/main" val="0"/>
+              </a:ext>
+            </a:extLst>
+          </a:blip>
+          <a:stretch>
+            <a:fillRect/>
+          </a:stretch>
+        </p:blipFill>
+        <p:spPr>
+          <a:xfrm>
+            <a:off x="214309" y="134914"/>
+            <a:ext cx="6349206" cy="2311111"/>
+          </a:xfrm>
+          <a:prstGeom prst="rect">
+            <a:avLst/>
+          </a:prstGeom>
+          <a:ln>
+            <a:noFill/>
+          </a:ln>
+          <a:effectLst>
+            <a:softEdge rad="112500"/>
+          </a:effectLst>
+        </p:spPr>
+      </p:pic>
+      <p:sp>
+        <p:nvSpPr>
+          <p:cNvPr id="13" name="ZoneTexte 12">
+            <a:extLst>
+              <a:ext uri="{FF2B5EF4-FFF2-40B4-BE49-F238E27FC236}">
+                <a16:creationId xmlns:a16="http://schemas.microsoft.com/office/drawing/2014/main" id="{686E2664-8122-4E6A-AB7F-AFD89B24368D}"/>
+              </a:ext>
+            </a:extLst>
+          </p:cNvPr>
+          <p:cNvSpPr txBox="1"/>
+          <p:nvPr/>
+        </p:nvSpPr>
+        <p:spPr>
+          <a:xfrm>
+            <a:off x="7627889" y="2076693"/>
+            <a:ext cx="570990" cy="369332"/>
+          </a:xfrm>
+          <a:prstGeom prst="rect">
+            <a:avLst/>
+          </a:prstGeom>
+          <a:noFill/>
+        </p:spPr>
+        <p:txBody>
+          <a:bodyPr wrap="none" rtlCol="0">
+            <a:spAutoFit/>
+          </a:bodyPr>
+          <a:lstStyle/>
+          <a:p>
+            <a:r>
+              <a:rPr lang="fr-FR" dirty="0"/>
+              <a:t>Ellie</a:t>
+            </a:r>
+          </a:p>
+        </p:txBody>
+      </p:sp>
+      <p:sp>
+        <p:nvSpPr>
+          <p:cNvPr id="14" name="ZoneTexte 13">
+            <a:extLst>
+              <a:ext uri="{FF2B5EF4-FFF2-40B4-BE49-F238E27FC236}">
+                <a16:creationId xmlns:a16="http://schemas.microsoft.com/office/drawing/2014/main" id="{1C3245FA-6636-476D-A095-F3377DE4D174}"/>
+              </a:ext>
+            </a:extLst>
+          </p:cNvPr>
+          <p:cNvSpPr txBox="1"/>
+          <p:nvPr/>
+        </p:nvSpPr>
+        <p:spPr>
+          <a:xfrm>
+            <a:off x="9688705" y="1781294"/>
+            <a:ext cx="548548" cy="369332"/>
+          </a:xfrm>
+          <a:prstGeom prst="rect">
+            <a:avLst/>
+          </a:prstGeom>
+          <a:noFill/>
+        </p:spPr>
+        <p:txBody>
+          <a:bodyPr wrap="none" rtlCol="0">
+            <a:spAutoFit/>
+          </a:bodyPr>
+          <a:lstStyle/>
+          <a:p>
+            <a:r>
+              <a:rPr lang="fr-FR" dirty="0"/>
+              <a:t>Joel</a:t>
             </a:r>
           </a:p>
         </p:txBody>
@@ -4217,6 +4604,18 @@
   <p:clrMapOvr>
     <a:overrideClrMapping bg1="dk1" tx1="lt1" bg2="dk2" tx2="lt2" accent1="accent1" accent2="accent2" accent3="accent3" accent4="accent4" accent5="accent5" accent6="accent6" hlink="hlink" folHlink="folHlink"/>
   </p:clrMapOvr>
+  <mc:AlternateContent xmlns:mc="http://schemas.openxmlformats.org/markup-compatibility/2006" xmlns:p159="http://schemas.microsoft.com/office/powerpoint/2015/09/main">
+    <mc:Choice Requires="p159">
+      <p:transition xmlns:p14="http://schemas.microsoft.com/office/powerpoint/2010/main" spd="slow" p14:dur="2000">
+        <p159:morph option="byObject"/>
+      </p:transition>
+    </mc:Choice>
+    <mc:Fallback xmlns="">
+      <p:transition spd="slow">
+        <p:fade/>
+      </p:transition>
+    </mc:Fallback>
+  </mc:AlternateContent>
 </p:sld>
 </file>
 
@@ -4504,11 +4903,191 @@
           <a:p>
             <a:r>
               <a:rPr lang="fr-FR" dirty="0"/>
-              <a:t>Présentation des armes jouable dans le jeux.</a:t>
-            </a:r>
-          </a:p>
-        </p:txBody>
-      </p:sp>
+              <a:t>Présentation des armes jouables dans le jeu.</a:t>
+            </a:r>
+          </a:p>
+        </p:txBody>
+      </p:sp>
+      <p:pic>
+        <p:nvPicPr>
+          <p:cNvPr id="6" name="Image 5" descr="Une image contenant personne&#10;&#10;Description générée automatiquement">
+            <a:extLst>
+              <a:ext uri="{FF2B5EF4-FFF2-40B4-BE49-F238E27FC236}">
+                <a16:creationId xmlns:a16="http://schemas.microsoft.com/office/drawing/2014/main" id="{6751C396-D1F7-4B65-8B72-8E802CCB074F}"/>
+              </a:ext>
+            </a:extLst>
+          </p:cNvPr>
+          <p:cNvPicPr>
+            <a:picLocks noChangeAspect="1"/>
+          </p:cNvPicPr>
+          <p:nvPr/>
+        </p:nvPicPr>
+        <p:blipFill>
+          <a:blip r:embed="rId3">
+            <a:extLst>
+              <a:ext uri="{28A0092B-C50C-407E-A947-70E740481C1C}">
+                <a14:useLocalDpi xmlns:a14="http://schemas.microsoft.com/office/drawing/2010/main" val="0"/>
+              </a:ext>
+            </a:extLst>
+          </a:blip>
+          <a:stretch>
+            <a:fillRect/>
+          </a:stretch>
+        </p:blipFill>
+        <p:spPr>
+          <a:xfrm>
+            <a:off x="7942468" y="15240"/>
+            <a:ext cx="3971925" cy="4876800"/>
+          </a:xfrm>
+          <a:prstGeom prst="rect">
+            <a:avLst/>
+          </a:prstGeom>
+        </p:spPr>
+      </p:pic>
+      <p:pic>
+        <p:nvPicPr>
+          <p:cNvPr id="11" name="Image 10" descr="Une image contenant arme, arme à feu&#10;&#10;Description générée automatiquement">
+            <a:extLst>
+              <a:ext uri="{FF2B5EF4-FFF2-40B4-BE49-F238E27FC236}">
+                <a16:creationId xmlns:a16="http://schemas.microsoft.com/office/drawing/2014/main" id="{492FEFDF-D61E-4E09-B988-A5D577A54A1D}"/>
+              </a:ext>
+            </a:extLst>
+          </p:cNvPr>
+          <p:cNvPicPr>
+            <a:picLocks noChangeAspect="1"/>
+          </p:cNvPicPr>
+          <p:nvPr/>
+        </p:nvPicPr>
+        <p:blipFill>
+          <a:blip r:embed="rId4">
+            <a:extLst>
+              <a:ext uri="{28A0092B-C50C-407E-A947-70E740481C1C}">
+                <a14:useLocalDpi xmlns:a14="http://schemas.microsoft.com/office/drawing/2010/main" val="0"/>
+              </a:ext>
+            </a:extLst>
+          </a:blip>
+          <a:stretch>
+            <a:fillRect/>
+          </a:stretch>
+        </p:blipFill>
+        <p:spPr>
+          <a:xfrm>
+            <a:off x="3653091" y="337046"/>
+            <a:ext cx="1628914" cy="1628914"/>
+          </a:xfrm>
+          <a:prstGeom prst="rect">
+            <a:avLst/>
+          </a:prstGeom>
+        </p:spPr>
+      </p:pic>
+      <p:pic>
+        <p:nvPicPr>
+          <p:cNvPr id="14" name="Image 13" descr="Une image contenant flèche&#10;&#10;Description générée automatiquement">
+            <a:extLst>
+              <a:ext uri="{FF2B5EF4-FFF2-40B4-BE49-F238E27FC236}">
+                <a16:creationId xmlns:a16="http://schemas.microsoft.com/office/drawing/2014/main" id="{71B2E486-76F4-488B-860A-9D06790002C8}"/>
+              </a:ext>
+            </a:extLst>
+          </p:cNvPr>
+          <p:cNvPicPr>
+            <a:picLocks noChangeAspect="1"/>
+          </p:cNvPicPr>
+          <p:nvPr/>
+        </p:nvPicPr>
+        <p:blipFill>
+          <a:blip r:embed="rId5">
+            <a:extLst>
+              <a:ext uri="{28A0092B-C50C-407E-A947-70E740481C1C}">
+                <a14:useLocalDpi xmlns:a14="http://schemas.microsoft.com/office/drawing/2010/main" val="0"/>
+              </a:ext>
+            </a:extLst>
+          </a:blip>
+          <a:stretch>
+            <a:fillRect/>
+          </a:stretch>
+        </p:blipFill>
+        <p:spPr>
+          <a:xfrm>
+            <a:off x="447176" y="2072471"/>
+            <a:ext cx="2438400" cy="2438400"/>
+          </a:xfrm>
+          <a:prstGeom prst="rect">
+            <a:avLst/>
+          </a:prstGeom>
+        </p:spPr>
+      </p:pic>
+      <p:pic>
+        <p:nvPicPr>
+          <p:cNvPr id="16" name="Image 15">
+            <a:extLst>
+              <a:ext uri="{FF2B5EF4-FFF2-40B4-BE49-F238E27FC236}">
+                <a16:creationId xmlns:a16="http://schemas.microsoft.com/office/drawing/2014/main" id="{56B595B3-F86F-4053-874A-F5402FB97B74}"/>
+              </a:ext>
+            </a:extLst>
+          </p:cNvPr>
+          <p:cNvPicPr>
+            <a:picLocks noChangeAspect="1"/>
+          </p:cNvPicPr>
+          <p:nvPr/>
+        </p:nvPicPr>
+        <p:blipFill>
+          <a:blip r:embed="rId6">
+            <a:extLst>
+              <a:ext uri="{28A0092B-C50C-407E-A947-70E740481C1C}">
+                <a14:useLocalDpi xmlns:a14="http://schemas.microsoft.com/office/drawing/2010/main" val="0"/>
+              </a:ext>
+            </a:extLst>
+          </a:blip>
+          <a:stretch>
+            <a:fillRect/>
+          </a:stretch>
+        </p:blipFill>
+        <p:spPr>
+          <a:xfrm rot="1785261">
+            <a:off x="2606980" y="1246355"/>
+            <a:ext cx="3980958" cy="4254649"/>
+          </a:xfrm>
+          <a:prstGeom prst="rect">
+            <a:avLst/>
+          </a:prstGeom>
+        </p:spPr>
+      </p:pic>
+      <p:pic>
+        <p:nvPicPr>
+          <p:cNvPr id="18" name="Image 17" descr="Une image contenant arme, couteau&#10;&#10;Description générée automatiquement">
+            <a:extLst>
+              <a:ext uri="{FF2B5EF4-FFF2-40B4-BE49-F238E27FC236}">
+                <a16:creationId xmlns:a16="http://schemas.microsoft.com/office/drawing/2014/main" id="{4CB23C3B-8A59-4D80-B314-B57AE29BA5FD}"/>
+              </a:ext>
+            </a:extLst>
+          </p:cNvPr>
+          <p:cNvPicPr>
+            <a:picLocks noChangeAspect="1"/>
+          </p:cNvPicPr>
+          <p:nvPr/>
+        </p:nvPicPr>
+        <p:blipFill>
+          <a:blip r:embed="rId7">
+            <a:extLst>
+              <a:ext uri="{28A0092B-C50C-407E-A947-70E740481C1C}">
+                <a14:useLocalDpi xmlns:a14="http://schemas.microsoft.com/office/drawing/2010/main" val="0"/>
+              </a:ext>
+            </a:extLst>
+          </a:blip>
+          <a:stretch>
+            <a:fillRect/>
+          </a:stretch>
+        </p:blipFill>
+        <p:spPr>
+          <a:xfrm>
+            <a:off x="337246" y="129614"/>
+            <a:ext cx="2793651" cy="1942857"/>
+          </a:xfrm>
+          <a:prstGeom prst="rect">
+            <a:avLst/>
+          </a:prstGeom>
+        </p:spPr>
+      </p:pic>
     </p:spTree>
     <p:extLst>
       <p:ext uri="{BB962C8B-B14F-4D97-AF65-F5344CB8AC3E}">
@@ -4519,6 +5098,18 @@
   <p:clrMapOvr>
     <a:overrideClrMapping bg1="dk1" tx1="lt1" bg2="dk2" tx2="lt2" accent1="accent1" accent2="accent2" accent3="accent3" accent4="accent4" accent5="accent5" accent6="accent6" hlink="hlink" folHlink="folHlink"/>
   </p:clrMapOvr>
+  <mc:AlternateContent xmlns:mc="http://schemas.openxmlformats.org/markup-compatibility/2006" xmlns:p159="http://schemas.microsoft.com/office/powerpoint/2015/09/main">
+    <mc:Choice Requires="p159">
+      <p:transition xmlns:p14="http://schemas.microsoft.com/office/powerpoint/2010/main" spd="slow" p14:dur="2000">
+        <p159:morph option="byObject"/>
+      </p:transition>
+    </mc:Choice>
+    <mc:Fallback xmlns="">
+      <p:transition spd="slow">
+        <p:fade/>
+      </p:transition>
+    </mc:Fallback>
+  </mc:AlternateContent>
 </p:sld>
 </file>
 
@@ -4716,7 +5307,7 @@
                   </a:schemeClr>
                 </a:solidFill>
               </a:rPr>
-              <a:t>Présentation de l’UML</a:t>
+              <a:t>Présentation du scenario</a:t>
             </a:r>
           </a:p>
         </p:txBody>
@@ -4776,16 +5367,262 @@
           </a:fontRef>
         </p:style>
       </p:cxnSp>
+      <p:sp>
+        <p:nvSpPr>
+          <p:cNvPr id="3" name="ZoneTexte 2">
+            <a:extLst>
+              <a:ext uri="{FF2B5EF4-FFF2-40B4-BE49-F238E27FC236}">
+                <a16:creationId xmlns:a16="http://schemas.microsoft.com/office/drawing/2014/main" id="{C742737F-D2CC-46C3-AA72-5EB0D307E0D0}"/>
+              </a:ext>
+            </a:extLst>
+          </p:cNvPr>
+          <p:cNvSpPr txBox="1"/>
+          <p:nvPr/>
+        </p:nvSpPr>
+        <p:spPr>
+          <a:xfrm>
+            <a:off x="1451969" y="1153562"/>
+            <a:ext cx="9233553" cy="369332"/>
+          </a:xfrm>
+          <a:prstGeom prst="rect">
+            <a:avLst/>
+          </a:prstGeom>
+          <a:noFill/>
+        </p:spPr>
+        <p:txBody>
+          <a:bodyPr wrap="none" rtlCol="0">
+            <a:spAutoFit/>
+          </a:bodyPr>
+          <a:lstStyle/>
+          <a:p>
+            <a:r>
+              <a:rPr lang="fr-FR" dirty="0">
+                <a:highlight>
+                  <a:srgbClr val="000000"/>
+                </a:highlight>
+              </a:rPr>
+              <a:t>Introduction =&gt; présentation des deux joueurs et présentation de la quête principale à effectuer </a:t>
+            </a:r>
+          </a:p>
+        </p:txBody>
+      </p:sp>
+      <p:sp>
+        <p:nvSpPr>
+          <p:cNvPr id="7" name="ZoneTexte 6">
+            <a:extLst>
+              <a:ext uri="{FF2B5EF4-FFF2-40B4-BE49-F238E27FC236}">
+                <a16:creationId xmlns:a16="http://schemas.microsoft.com/office/drawing/2014/main" id="{318F2A48-4EE5-4864-B6FC-D4AF66B14703}"/>
+              </a:ext>
+            </a:extLst>
+          </p:cNvPr>
+          <p:cNvSpPr txBox="1"/>
+          <p:nvPr/>
+        </p:nvSpPr>
+        <p:spPr>
+          <a:xfrm>
+            <a:off x="1451969" y="1781294"/>
+            <a:ext cx="8657178" cy="369332"/>
+          </a:xfrm>
+          <a:prstGeom prst="rect">
+            <a:avLst/>
+          </a:prstGeom>
+          <a:noFill/>
+        </p:spPr>
+        <p:txBody>
+          <a:bodyPr wrap="none" rtlCol="0">
+            <a:spAutoFit/>
+          </a:bodyPr>
+          <a:lstStyle/>
+          <a:p>
+            <a:r>
+              <a:rPr lang="fr-FR" dirty="0">
+                <a:highlight>
+                  <a:srgbClr val="000000"/>
+                </a:highlight>
+              </a:rPr>
+              <a:t>Premier Combat  =&gt; descriptif combat , choix personnage, choix arme, et ennemi rodeurs  </a:t>
+            </a:r>
+          </a:p>
+        </p:txBody>
+      </p:sp>
+      <p:sp>
+        <p:nvSpPr>
+          <p:cNvPr id="8" name="ZoneTexte 7">
+            <a:extLst>
+              <a:ext uri="{FF2B5EF4-FFF2-40B4-BE49-F238E27FC236}">
+                <a16:creationId xmlns:a16="http://schemas.microsoft.com/office/drawing/2014/main" id="{CC688D32-28E0-44B0-A344-D62D4EC8329F}"/>
+              </a:ext>
+            </a:extLst>
+          </p:cNvPr>
+          <p:cNvSpPr txBox="1"/>
+          <p:nvPr/>
+        </p:nvSpPr>
+        <p:spPr>
+          <a:xfrm>
+            <a:off x="1451969" y="2428759"/>
+            <a:ext cx="5010282" cy="369332"/>
+          </a:xfrm>
+          <a:prstGeom prst="rect">
+            <a:avLst/>
+          </a:prstGeom>
+          <a:noFill/>
+        </p:spPr>
+        <p:txBody>
+          <a:bodyPr wrap="none" rtlCol="0">
+            <a:spAutoFit/>
+          </a:bodyPr>
+          <a:lstStyle/>
+          <a:p>
+            <a:r>
+              <a:rPr lang="fr-FR" dirty="0">
+                <a:highlight>
+                  <a:srgbClr val="000000"/>
+                </a:highlight>
+              </a:rPr>
+              <a:t>Deuxième  Combat =&gt; // // //, et ennemie coureurs</a:t>
+            </a:r>
+          </a:p>
+        </p:txBody>
+      </p:sp>
+      <p:sp>
+        <p:nvSpPr>
+          <p:cNvPr id="9" name="ZoneTexte 8">
+            <a:extLst>
+              <a:ext uri="{FF2B5EF4-FFF2-40B4-BE49-F238E27FC236}">
+                <a16:creationId xmlns:a16="http://schemas.microsoft.com/office/drawing/2014/main" id="{C4A868AE-532C-4BF1-B02A-1E0FCA48970B}"/>
+              </a:ext>
+            </a:extLst>
+          </p:cNvPr>
+          <p:cNvSpPr txBox="1"/>
+          <p:nvPr/>
+        </p:nvSpPr>
+        <p:spPr>
+          <a:xfrm>
+            <a:off x="1457035" y="3006844"/>
+            <a:ext cx="5005216" cy="369332"/>
+          </a:xfrm>
+          <a:prstGeom prst="rect">
+            <a:avLst/>
+          </a:prstGeom>
+          <a:noFill/>
+        </p:spPr>
+        <p:txBody>
+          <a:bodyPr wrap="none" rtlCol="0">
+            <a:spAutoFit/>
+          </a:bodyPr>
+          <a:lstStyle/>
+          <a:p>
+            <a:r>
+              <a:rPr lang="fr-FR" dirty="0">
+                <a:highlight>
+                  <a:srgbClr val="000000"/>
+                </a:highlight>
+              </a:rPr>
+              <a:t>Troisième Combat =&gt; // // //, et ennemie claqueurs</a:t>
+            </a:r>
+          </a:p>
+        </p:txBody>
+      </p:sp>
+      <p:sp>
+        <p:nvSpPr>
+          <p:cNvPr id="11" name="ZoneTexte 10">
+            <a:extLst>
+              <a:ext uri="{FF2B5EF4-FFF2-40B4-BE49-F238E27FC236}">
+                <a16:creationId xmlns:a16="http://schemas.microsoft.com/office/drawing/2014/main" id="{00F1FFA6-3468-428A-881C-9034B56C6BB3}"/>
+              </a:ext>
+            </a:extLst>
+          </p:cNvPr>
+          <p:cNvSpPr txBox="1"/>
+          <p:nvPr/>
+        </p:nvSpPr>
+        <p:spPr>
+          <a:xfrm>
+            <a:off x="1457035" y="3580352"/>
+            <a:ext cx="4638962" cy="369332"/>
+          </a:xfrm>
+          <a:prstGeom prst="rect">
+            <a:avLst/>
+          </a:prstGeom>
+          <a:noFill/>
+        </p:spPr>
+        <p:txBody>
+          <a:bodyPr wrap="none" rtlCol="0">
+            <a:spAutoFit/>
+          </a:bodyPr>
+          <a:lstStyle/>
+          <a:p>
+            <a:r>
+              <a:rPr lang="fr-FR" dirty="0">
+                <a:highlight>
+                  <a:srgbClr val="000000"/>
+                </a:highlight>
+              </a:rPr>
+              <a:t>Dernier Combat =&gt; // // // , et ennemie colosse</a:t>
+            </a:r>
+          </a:p>
+        </p:txBody>
+      </p:sp>
+      <p:sp>
+        <p:nvSpPr>
+          <p:cNvPr id="13" name="ZoneTexte 12">
+            <a:extLst>
+              <a:ext uri="{FF2B5EF4-FFF2-40B4-BE49-F238E27FC236}">
+                <a16:creationId xmlns:a16="http://schemas.microsoft.com/office/drawing/2014/main" id="{547936D4-E0CB-4327-8A52-786EAC84B11B}"/>
+              </a:ext>
+            </a:extLst>
+          </p:cNvPr>
+          <p:cNvSpPr txBox="1"/>
+          <p:nvPr/>
+        </p:nvSpPr>
+        <p:spPr>
+          <a:xfrm>
+            <a:off x="1477896" y="4265414"/>
+            <a:ext cx="7026282" cy="369332"/>
+          </a:xfrm>
+          <a:prstGeom prst="rect">
+            <a:avLst/>
+          </a:prstGeom>
+          <a:noFill/>
+        </p:spPr>
+        <p:txBody>
+          <a:bodyPr wrap="none" rtlCol="0">
+            <a:spAutoFit/>
+          </a:bodyPr>
+          <a:lstStyle/>
+          <a:p>
+            <a:r>
+              <a:rPr lang="fr-FR" dirty="0">
+                <a:highlight>
+                  <a:srgbClr val="000000"/>
+                </a:highlight>
+              </a:rPr>
+              <a:t>Fin du jeux  =&gt; un choix s’offre à vous il seras crucial ne vous trompez pas.</a:t>
+            </a:r>
+          </a:p>
+        </p:txBody>
+      </p:sp>
     </p:spTree>
     <p:extLst>
       <p:ext uri="{BB962C8B-B14F-4D97-AF65-F5344CB8AC3E}">
-        <p14:creationId xmlns:p14="http://schemas.microsoft.com/office/powerpoint/2010/main" val="2317779735"/>
+        <p14:creationId xmlns:p14="http://schemas.microsoft.com/office/powerpoint/2010/main" val="157163196"/>
       </p:ext>
     </p:extLst>
   </p:cSld>
   <p:clrMapOvr>
     <a:overrideClrMapping bg1="dk1" tx1="lt1" bg2="dk2" tx2="lt2" accent1="accent1" accent2="accent2" accent3="accent3" accent4="accent4" accent5="accent5" accent6="accent6" hlink="hlink" folHlink="folHlink"/>
   </p:clrMapOvr>
+  <mc:AlternateContent xmlns:mc="http://schemas.openxmlformats.org/markup-compatibility/2006" xmlns:p159="http://schemas.microsoft.com/office/powerpoint/2015/09/main">
+    <mc:Choice Requires="p159">
+      <p:transition xmlns:p14="http://schemas.microsoft.com/office/powerpoint/2010/main" spd="slow" p14:dur="2000">
+        <p159:morph option="byObject"/>
+      </p:transition>
+    </mc:Choice>
+    <mc:Fallback xmlns="">
+      <p:transition spd="slow">
+        <p:fade/>
+      </p:transition>
+    </mc:Fallback>
+  </mc:AlternateContent>
 </p:sld>
 </file>
 
@@ -4983,7 +5820,7 @@
                   </a:schemeClr>
                 </a:solidFill>
               </a:rPr>
-              <a:t>Présentation du scenario</a:t>
+              <a:t>Présentation de l’UML </a:t>
             </a:r>
           </a:p>
         </p:txBody>
@@ -5043,16 +5880,64 @@
           </a:fontRef>
         </p:style>
       </p:cxnSp>
+      <p:pic>
+        <p:nvPicPr>
+          <p:cNvPr id="4" name="Image 3">
+            <a:extLst>
+              <a:ext uri="{FF2B5EF4-FFF2-40B4-BE49-F238E27FC236}">
+                <a16:creationId xmlns:a16="http://schemas.microsoft.com/office/drawing/2014/main" id="{64D8E7E4-7B2B-45EE-9EDB-42532C8C3EB3}"/>
+              </a:ext>
+            </a:extLst>
+          </p:cNvPr>
+          <p:cNvPicPr>
+            <a:picLocks noChangeAspect="1"/>
+          </p:cNvPicPr>
+          <p:nvPr/>
+        </p:nvPicPr>
+        <p:blipFill>
+          <a:blip r:embed="rId3">
+            <a:extLst>
+              <a:ext uri="{28A0092B-C50C-407E-A947-70E740481C1C}">
+                <a14:useLocalDpi xmlns:a14="http://schemas.microsoft.com/office/drawing/2010/main" val="0"/>
+              </a:ext>
+            </a:extLst>
+          </a:blip>
+          <a:stretch>
+            <a:fillRect/>
+          </a:stretch>
+        </p:blipFill>
+        <p:spPr>
+          <a:xfrm>
+            <a:off x="2118444" y="441960"/>
+            <a:ext cx="7955112" cy="3927545"/>
+          </a:xfrm>
+          <a:prstGeom prst="rect">
+            <a:avLst/>
+          </a:prstGeom>
+        </p:spPr>
+      </p:pic>
     </p:spTree>
     <p:extLst>
       <p:ext uri="{BB962C8B-B14F-4D97-AF65-F5344CB8AC3E}">
-        <p14:creationId xmlns:p14="http://schemas.microsoft.com/office/powerpoint/2010/main" val="157163196"/>
+        <p14:creationId xmlns:p14="http://schemas.microsoft.com/office/powerpoint/2010/main" val="2317779735"/>
       </p:ext>
     </p:extLst>
   </p:cSld>
   <p:clrMapOvr>
     <a:overrideClrMapping bg1="dk1" tx1="lt1" bg2="dk2" tx2="lt2" accent1="accent1" accent2="accent2" accent3="accent3" accent4="accent4" accent5="accent5" accent6="accent6" hlink="hlink" folHlink="folHlink"/>
   </p:clrMapOvr>
+  <mc:AlternateContent xmlns:mc="http://schemas.openxmlformats.org/markup-compatibility/2006" xmlns:p159="http://schemas.microsoft.com/office/powerpoint/2015/09/main">
+    <mc:Choice Requires="p159">
+      <p:transition xmlns:p14="http://schemas.microsoft.com/office/powerpoint/2010/main" spd="slow" p14:dur="2000">
+        <p159:morph option="byObject"/>
+      </p:transition>
+    </mc:Choice>
+    <mc:Fallback xmlns="">
+      <p:transition spd="slow">
+        <p:fade/>
+      </p:transition>
+    </mc:Fallback>
+  </mc:AlternateContent>
 </p:sld>
 </file>
 
@@ -5083,10 +5968,10 @@
       </p:grpSpPr>
       <p:pic>
         <p:nvPicPr>
-          <p:cNvPr id="5" name="Espace réservé du contenu 4" descr="Une image contenant extérieur, homme, jeune, tenant&#10;&#10;Description générée automatiquement">
-            <a:extLst>
-              <a:ext uri="{FF2B5EF4-FFF2-40B4-BE49-F238E27FC236}">
-                <a16:creationId xmlns:a16="http://schemas.microsoft.com/office/drawing/2014/main" id="{809E5E4D-631D-4559-B3D3-AB5A183C4CD0}"/>
+          <p:cNvPr id="5" name="Espace réservé du contenu 4" descr="Une image contenant extérieur, bâtiment, herbe, rue&#10;&#10;Description générée automatiquement">
+            <a:extLst>
+              <a:ext uri="{FF2B5EF4-FFF2-40B4-BE49-F238E27FC236}">
+                <a16:creationId xmlns:a16="http://schemas.microsoft.com/office/drawing/2014/main" id="{C0EE1418-FA02-4C95-BB9E-4384159E0E28}"/>
               </a:ext>
             </a:extLst>
           </p:cNvPr>
@@ -5106,12 +5991,12 @@
               </a:ext>
             </a:extLst>
           </a:blip>
-          <a:srcRect/>
+          <a:srcRect l="7443" r="2334" b="-1"/>
           <a:stretch/>
         </p:blipFill>
         <p:spPr>
           <a:xfrm>
-            <a:off x="20" y="0"/>
+            <a:off x="20" y="10"/>
             <a:ext cx="12191980" cy="6857990"/>
           </a:xfrm>
           <a:prstGeom prst="rect">
@@ -5121,7 +6006,7 @@
       </p:pic>
       <p:sp>
         <p:nvSpPr>
-          <p:cNvPr id="14" name="Rectangle 9">
+          <p:cNvPr id="10" name="Rectangle 9">
             <a:extLst>
               <a:ext uri="{FF2B5EF4-FFF2-40B4-BE49-F238E27FC236}">
                 <a16:creationId xmlns:a16="http://schemas.microsoft.com/office/drawing/2014/main" id="{D38A241E-0395-41E5-8607-BAA2799A4374}"/>
@@ -5218,7 +6103,7 @@
           <p:cNvPr id="2" name="Titre 1">
             <a:extLst>
               <a:ext uri="{FF2B5EF4-FFF2-40B4-BE49-F238E27FC236}">
-                <a16:creationId xmlns:a16="http://schemas.microsoft.com/office/drawing/2014/main" id="{07AE0670-618A-48C2-A04C-2C1D54DAC7FD}"/>
+                <a16:creationId xmlns:a16="http://schemas.microsoft.com/office/drawing/2014/main" id="{5178BF73-D366-433F-9E69-59981B851737}"/>
               </a:ext>
             </a:extLst>
           </p:cNvPr>
@@ -5241,7 +6126,6 @@
           </a:bodyPr>
           <a:lstStyle/>
           <a:p>
-            <a:pPr algn="ctr"/>
             <a:r>
               <a:rPr lang="en-US" sz="4800" dirty="0">
                 <a:solidFill>
@@ -5251,14 +6135,14 @@
                   </a:schemeClr>
                 </a:solidFill>
               </a:rPr>
-              <a:t>Fin </a:t>
+              <a:t>Présentation de l’UML </a:t>
             </a:r>
           </a:p>
         </p:txBody>
       </p:sp>
       <p:cxnSp>
         <p:nvCxnSpPr>
-          <p:cNvPr id="15" name="Straight Connector 11">
+          <p:cNvPr id="12" name="Straight Connector 11">
             <a:extLst>
               <a:ext uri="{FF2B5EF4-FFF2-40B4-BE49-F238E27FC236}">
                 <a16:creationId xmlns:a16="http://schemas.microsoft.com/office/drawing/2014/main" id="{CE352288-84AD-4CA8-BCD5-76C29D34E1DB}"/>
@@ -5311,6 +6195,1064 @@
           </a:fontRef>
         </p:style>
       </p:cxnSp>
+      <p:pic>
+        <p:nvPicPr>
+          <p:cNvPr id="6" name="Image 5">
+            <a:extLst>
+              <a:ext uri="{FF2B5EF4-FFF2-40B4-BE49-F238E27FC236}">
+                <a16:creationId xmlns:a16="http://schemas.microsoft.com/office/drawing/2014/main" id="{1933BCF8-2570-4B12-B112-AA19AFF867D4}"/>
+              </a:ext>
+            </a:extLst>
+          </p:cNvPr>
+          <p:cNvPicPr>
+            <a:picLocks noChangeAspect="1"/>
+          </p:cNvPicPr>
+          <p:nvPr/>
+        </p:nvPicPr>
+        <p:blipFill>
+          <a:blip r:embed="rId3">
+            <a:extLst>
+              <a:ext uri="{28A0092B-C50C-407E-A947-70E740481C1C}">
+                <a14:useLocalDpi xmlns:a14="http://schemas.microsoft.com/office/drawing/2010/main" val="0"/>
+              </a:ext>
+            </a:extLst>
+          </a:blip>
+          <a:stretch>
+            <a:fillRect/>
+          </a:stretch>
+        </p:blipFill>
+        <p:spPr>
+          <a:xfrm>
+            <a:off x="2315620" y="0"/>
+            <a:ext cx="7252124" cy="4817755"/>
+          </a:xfrm>
+          <a:prstGeom prst="rect">
+            <a:avLst/>
+          </a:prstGeom>
+        </p:spPr>
+      </p:pic>
+    </p:spTree>
+    <p:extLst>
+      <p:ext uri="{BB962C8B-B14F-4D97-AF65-F5344CB8AC3E}">
+        <p14:creationId xmlns:p14="http://schemas.microsoft.com/office/powerpoint/2010/main" val="3383970520"/>
+      </p:ext>
+    </p:extLst>
+  </p:cSld>
+  <p:clrMapOvr>
+    <a:overrideClrMapping bg1="dk1" tx1="lt1" bg2="dk2" tx2="lt2" accent1="accent1" accent2="accent2" accent3="accent3" accent4="accent4" accent5="accent5" accent6="accent6" hlink="hlink" folHlink="folHlink"/>
+  </p:clrMapOvr>
+  <mc:AlternateContent xmlns:mc="http://schemas.openxmlformats.org/markup-compatibility/2006" xmlns:p159="http://schemas.microsoft.com/office/powerpoint/2015/09/main">
+    <mc:Choice Requires="p159">
+      <p:transition xmlns:p14="http://schemas.microsoft.com/office/powerpoint/2010/main" spd="slow" p14:dur="2000">
+        <p159:morph option="byObject"/>
+      </p:transition>
+    </mc:Choice>
+    <mc:Fallback xmlns="">
+      <p:transition spd="slow">
+        <p:fade/>
+      </p:transition>
+    </mc:Fallback>
+  </mc:AlternateContent>
+</p:sld>
+</file>
+
+<file path=ppt/slides/slide8.xml><?xml version="1.0" encoding="utf-8"?>
+<p:sld xmlns:a="http://schemas.openxmlformats.org/drawingml/2006/main" xmlns:r="http://schemas.openxmlformats.org/officeDocument/2006/relationships" xmlns:p="http://schemas.openxmlformats.org/presentationml/2006/main">
+  <p:cSld>
+    <p:bg>
+      <p:bgPr>
+        <a:solidFill>
+          <a:schemeClr val="bg1"/>
+        </a:solidFill>
+        <a:effectLst/>
+      </p:bgPr>
+    </p:bg>
+    <p:spTree>
+      <p:nvGrpSpPr>
+        <p:cNvPr id="1" name=""/>
+        <p:cNvGrpSpPr/>
+        <p:nvPr/>
+      </p:nvGrpSpPr>
+      <p:grpSpPr>
+        <a:xfrm>
+          <a:off x="0" y="0"/>
+          <a:ext cx="0" cy="0"/>
+          <a:chOff x="0" y="0"/>
+          <a:chExt cx="0" cy="0"/>
+        </a:xfrm>
+      </p:grpSpPr>
+      <p:pic>
+        <p:nvPicPr>
+          <p:cNvPr id="5" name="Espace réservé du contenu 4" descr="Une image contenant extérieur, bâtiment, herbe, rue&#10;&#10;Description générée automatiquement">
+            <a:extLst>
+              <a:ext uri="{FF2B5EF4-FFF2-40B4-BE49-F238E27FC236}">
+                <a16:creationId xmlns:a16="http://schemas.microsoft.com/office/drawing/2014/main" id="{C0EE1418-FA02-4C95-BB9E-4384159E0E28}"/>
+              </a:ext>
+            </a:extLst>
+          </p:cNvPr>
+          <p:cNvPicPr>
+            <a:picLocks noGrp="1" noChangeAspect="1"/>
+          </p:cNvPicPr>
+          <p:nvPr>
+            <p:ph idx="1"/>
+          </p:nvPr>
+        </p:nvPicPr>
+        <p:blipFill rotWithShape="1">
+          <a:blip r:embed="rId2">
+            <a:alphaModFix/>
+            <a:extLst>
+              <a:ext uri="{28A0092B-C50C-407E-A947-70E740481C1C}">
+                <a14:useLocalDpi xmlns:a14="http://schemas.microsoft.com/office/drawing/2010/main" val="0"/>
+              </a:ext>
+            </a:extLst>
+          </a:blip>
+          <a:srcRect l="7443" r="2334" b="-1"/>
+          <a:stretch/>
+        </p:blipFill>
+        <p:spPr>
+          <a:xfrm>
+            <a:off x="20" y="10"/>
+            <a:ext cx="12191980" cy="6857990"/>
+          </a:xfrm>
+          <a:prstGeom prst="rect">
+            <a:avLst/>
+          </a:prstGeom>
+        </p:spPr>
+      </p:pic>
+      <p:sp>
+        <p:nvSpPr>
+          <p:cNvPr id="10" name="Rectangle 9">
+            <a:extLst>
+              <a:ext uri="{FF2B5EF4-FFF2-40B4-BE49-F238E27FC236}">
+                <a16:creationId xmlns:a16="http://schemas.microsoft.com/office/drawing/2014/main" id="{D38A241E-0395-41E5-8607-BAA2799A4374}"/>
+              </a:ext>
+              <a:ext uri="{C183D7F6-B498-43B3-948B-1728B52AA6E4}">
+                <adec:decorative xmlns:adec="http://schemas.microsoft.com/office/drawing/2017/decorative" val="1"/>
+              </a:ext>
+            </a:extLst>
+          </p:cNvPr>
+          <p:cNvSpPr>
+            <a:spLocks noGrp="1" noRot="1" noChangeAspect="1" noMove="1" noResize="1" noEditPoints="1" noAdjustHandles="1" noChangeArrowheads="1" noChangeShapeType="1" noTextEdit="1"/>
+          </p:cNvSpPr>
+          <p:nvPr>
+            <p:extLst>
+              <p:ext uri="{386F3935-93C4-4BCD-93E2-E3B085C9AB24}">
+                <p16:designElem xmlns:p16="http://schemas.microsoft.com/office/powerpoint/2015/main" val="1"/>
+              </p:ext>
+            </p:extLst>
+          </p:nvPr>
+        </p:nvSpPr>
+        <p:spPr bwMode="ltGray">
+          <a:xfrm>
+            <a:off x="-1" y="4892040"/>
+            <a:ext cx="12191999" cy="1965960"/>
+          </a:xfrm>
+          <a:prstGeom prst="rect">
+            <a:avLst/>
+          </a:prstGeom>
+          <a:solidFill>
+            <a:schemeClr val="bg1">
+              <a:alpha val="72000"/>
+            </a:schemeClr>
+          </a:solidFill>
+          <a:ln w="127000" cap="sq" cmpd="thinThick">
+            <a:noFill/>
+          </a:ln>
+        </p:spPr>
+        <p:style>
+          <a:lnRef idx="2">
+            <a:schemeClr val="accent1">
+              <a:shade val="50000"/>
+            </a:schemeClr>
+          </a:lnRef>
+          <a:fillRef idx="1">
+            <a:schemeClr val="accent1"/>
+          </a:fillRef>
+          <a:effectRef idx="0">
+            <a:schemeClr val="accent1"/>
+          </a:effectRef>
+          <a:fontRef idx="minor">
+            <a:schemeClr val="lt1"/>
+          </a:fontRef>
+        </p:style>
+        <p:txBody>
+          <a:bodyPr rtlCol="0" anchor="ctr"/>
+          <a:lstStyle/>
+          <a:p>
+            <a:pPr marL="0" marR="0" lvl="0" indent="0" algn="ctr" defTabSz="914400" rtl="0" eaLnBrk="1" fontAlgn="auto" latinLnBrk="0" hangingPunct="1">
+              <a:lnSpc>
+                <a:spcPct val="100000"/>
+              </a:lnSpc>
+              <a:spcBef>
+                <a:spcPts val="0"/>
+              </a:spcBef>
+              <a:spcAft>
+                <a:spcPts val="0"/>
+              </a:spcAft>
+              <a:buClrTx/>
+              <a:buSzTx/>
+              <a:buFontTx/>
+              <a:buNone/>
+              <a:tabLst/>
+              <a:defRPr/>
+            </a:pPr>
+            <a:endParaRPr kumimoji="0" lang="en-US" sz="1800" b="0" i="0" u="none" strike="noStrike" kern="1200" cap="none" spc="0" normalizeH="0" baseline="0" noProof="0">
+              <a:ln>
+                <a:noFill/>
+              </a:ln>
+              <a:solidFill>
+                <a:prstClr val="white"/>
+              </a:solidFill>
+              <a:effectLst/>
+              <a:uLnTx/>
+              <a:uFillTx/>
+              <a:latin typeface="Calibri" panose="020F0502020204030204"/>
+              <a:ea typeface="+mn-ea"/>
+              <a:cs typeface="+mn-cs"/>
+            </a:endParaRPr>
+          </a:p>
+        </p:txBody>
+      </p:sp>
+      <p:sp>
+        <p:nvSpPr>
+          <p:cNvPr id="2" name="Titre 1">
+            <a:extLst>
+              <a:ext uri="{FF2B5EF4-FFF2-40B4-BE49-F238E27FC236}">
+                <a16:creationId xmlns:a16="http://schemas.microsoft.com/office/drawing/2014/main" id="{5178BF73-D366-433F-9E69-59981B851737}"/>
+              </a:ext>
+            </a:extLst>
+          </p:cNvPr>
+          <p:cNvSpPr>
+            <a:spLocks noGrp="1"/>
+          </p:cNvSpPr>
+          <p:nvPr>
+            <p:ph type="title"/>
+          </p:nvPr>
+        </p:nvSpPr>
+        <p:spPr>
+          <a:xfrm>
+            <a:off x="969264" y="5154168"/>
+            <a:ext cx="6973204" cy="1261872"/>
+          </a:xfrm>
+        </p:spPr>
+        <p:txBody>
+          <a:bodyPr vert="horz" lIns="91440" tIns="45720" rIns="91440" bIns="45720" rtlCol="0" anchor="ctr">
+            <a:normAutofit/>
+          </a:bodyPr>
+          <a:lstStyle/>
+          <a:p>
+            <a:r>
+              <a:rPr lang="fr-FR" sz="4800" dirty="0">
+                <a:solidFill>
+                  <a:schemeClr val="tx1">
+                    <a:lumMod val="85000"/>
+                    <a:lumOff val="15000"/>
+                  </a:schemeClr>
+                </a:solidFill>
+              </a:rPr>
+              <a:t>Avancement du code </a:t>
+            </a:r>
+          </a:p>
+        </p:txBody>
+      </p:sp>
+      <p:cxnSp>
+        <p:nvCxnSpPr>
+          <p:cNvPr id="12" name="Straight Connector 11">
+            <a:extLst>
+              <a:ext uri="{FF2B5EF4-FFF2-40B4-BE49-F238E27FC236}">
+                <a16:creationId xmlns:a16="http://schemas.microsoft.com/office/drawing/2014/main" id="{CE352288-84AD-4CA8-BCD5-76C29D34E1DB}"/>
+              </a:ext>
+              <a:ext uri="{C183D7F6-B498-43B3-948B-1728B52AA6E4}">
+                <adec:decorative xmlns:adec="http://schemas.microsoft.com/office/drawing/2017/decorative" val="1"/>
+              </a:ext>
+            </a:extLst>
+          </p:cNvPr>
+          <p:cNvCxnSpPr>
+            <a:cxnSpLocks noGrp="1" noRot="1" noChangeAspect="1" noMove="1" noResize="1" noEditPoints="1" noAdjustHandles="1" noChangeArrowheads="1" noChangeShapeType="1"/>
+          </p:cNvCxnSpPr>
+          <p:nvPr>
+            <p:extLst>
+              <p:ext uri="{386F3935-93C4-4BCD-93E2-E3B085C9AB24}">
+                <p16:designElem xmlns:p16="http://schemas.microsoft.com/office/powerpoint/2015/main" val="1"/>
+              </p:ext>
+            </p:extLst>
+          </p:nvPr>
+        </p:nvCxnSpPr>
+        <p:spPr>
+          <a:xfrm flipV="1">
+            <a:off x="8138160" y="5325066"/>
+            <a:ext cx="0" cy="914400"/>
+          </a:xfrm>
+          <a:prstGeom prst="line">
+            <a:avLst/>
+          </a:prstGeom>
+          <a:ln w="19050">
+            <a:solidFill>
+              <a:schemeClr val="tx1">
+                <a:lumMod val="85000"/>
+                <a:lumOff val="15000"/>
+              </a:schemeClr>
+            </a:solidFill>
+          </a:ln>
+        </p:spPr>
+        <p:style>
+          <a:lnRef idx="1">
+            <a:schemeClr val="accent1"/>
+          </a:lnRef>
+          <a:fillRef idx="0">
+            <a:schemeClr val="accent1"/>
+          </a:fillRef>
+          <a:effectRef idx="0">
+            <a:schemeClr val="accent1"/>
+          </a:effectRef>
+          <a:fontRef idx="minor">
+            <a:schemeClr val="tx1"/>
+          </a:fontRef>
+        </p:style>
+      </p:cxnSp>
+      <p:sp>
+        <p:nvSpPr>
+          <p:cNvPr id="3" name="ZoneTexte 2">
+            <a:extLst>
+              <a:ext uri="{FF2B5EF4-FFF2-40B4-BE49-F238E27FC236}">
+                <a16:creationId xmlns:a16="http://schemas.microsoft.com/office/drawing/2014/main" id="{6C9511CA-3160-460C-8A8B-7F2202CDC7CF}"/>
+              </a:ext>
+            </a:extLst>
+          </p:cNvPr>
+          <p:cNvSpPr txBox="1"/>
+          <p:nvPr/>
+        </p:nvSpPr>
+        <p:spPr>
+          <a:xfrm>
+            <a:off x="2054711" y="441960"/>
+            <a:ext cx="1812612" cy="923330"/>
+          </a:xfrm>
+          <a:prstGeom prst="rect">
+            <a:avLst/>
+          </a:prstGeom>
+          <a:noFill/>
+        </p:spPr>
+        <p:txBody>
+          <a:bodyPr wrap="none" rtlCol="0">
+            <a:spAutoFit/>
+          </a:bodyPr>
+          <a:lstStyle/>
+          <a:p>
+            <a:r>
+              <a:rPr lang="fr-FR" sz="5400" dirty="0">
+                <a:highlight>
+                  <a:srgbClr val="000000"/>
+                </a:highlight>
+              </a:rPr>
+              <a:t>Gwen</a:t>
+            </a:r>
+          </a:p>
+        </p:txBody>
+      </p:sp>
+      <p:sp>
+        <p:nvSpPr>
+          <p:cNvPr id="4" name="ZoneTexte 3">
+            <a:extLst>
+              <a:ext uri="{FF2B5EF4-FFF2-40B4-BE49-F238E27FC236}">
+                <a16:creationId xmlns:a16="http://schemas.microsoft.com/office/drawing/2014/main" id="{BE9FC38B-195F-4DAA-819B-B5EA2032CAC9}"/>
+              </a:ext>
+            </a:extLst>
+          </p:cNvPr>
+          <p:cNvSpPr txBox="1"/>
+          <p:nvPr/>
+        </p:nvSpPr>
+        <p:spPr>
+          <a:xfrm>
+            <a:off x="7019103" y="441960"/>
+            <a:ext cx="2238113" cy="923330"/>
+          </a:xfrm>
+          <a:prstGeom prst="rect">
+            <a:avLst/>
+          </a:prstGeom>
+          <a:noFill/>
+        </p:spPr>
+        <p:txBody>
+          <a:bodyPr wrap="none" rtlCol="0">
+            <a:spAutoFit/>
+          </a:bodyPr>
+          <a:lstStyle/>
+          <a:p>
+            <a:r>
+              <a:rPr lang="fr-FR" sz="5400" dirty="0">
+                <a:highlight>
+                  <a:srgbClr val="000000"/>
+                </a:highlight>
+              </a:rPr>
+              <a:t>Marion</a:t>
+            </a:r>
+          </a:p>
+        </p:txBody>
+      </p:sp>
+      <p:cxnSp>
+        <p:nvCxnSpPr>
+          <p:cNvPr id="7" name="Connecteur droit 6">
+            <a:extLst>
+              <a:ext uri="{FF2B5EF4-FFF2-40B4-BE49-F238E27FC236}">
+                <a16:creationId xmlns:a16="http://schemas.microsoft.com/office/drawing/2014/main" id="{15D6B2B8-7795-41CE-AD32-3620325B649B}"/>
+              </a:ext>
+            </a:extLst>
+          </p:cNvPr>
+          <p:cNvCxnSpPr>
+            <a:cxnSpLocks/>
+          </p:cNvCxnSpPr>
+          <p:nvPr/>
+        </p:nvCxnSpPr>
+        <p:spPr>
+          <a:xfrm>
+            <a:off x="5414682" y="358588"/>
+            <a:ext cx="0" cy="2994212"/>
+          </a:xfrm>
+          <a:prstGeom prst="line">
+            <a:avLst/>
+          </a:prstGeom>
+          <a:ln/>
+        </p:spPr>
+        <p:style>
+          <a:lnRef idx="3">
+            <a:schemeClr val="dk1"/>
+          </a:lnRef>
+          <a:fillRef idx="0">
+            <a:schemeClr val="dk1"/>
+          </a:fillRef>
+          <a:effectRef idx="2">
+            <a:schemeClr val="dk1"/>
+          </a:effectRef>
+          <a:fontRef idx="minor">
+            <a:schemeClr val="tx1"/>
+          </a:fontRef>
+        </p:style>
+      </p:cxnSp>
+      <p:pic>
+        <p:nvPicPr>
+          <p:cNvPr id="9" name="Image 8">
+            <a:extLst>
+              <a:ext uri="{FF2B5EF4-FFF2-40B4-BE49-F238E27FC236}">
+                <a16:creationId xmlns:a16="http://schemas.microsoft.com/office/drawing/2014/main" id="{FA03F9B1-FC26-44E1-A0C8-48C8ABB0F191}"/>
+              </a:ext>
+            </a:extLst>
+          </p:cNvPr>
+          <p:cNvPicPr>
+            <a:picLocks noChangeAspect="1"/>
+          </p:cNvPicPr>
+          <p:nvPr/>
+        </p:nvPicPr>
+        <p:blipFill>
+          <a:blip r:embed="rId3">
+            <a:extLst>
+              <a:ext uri="{28A0092B-C50C-407E-A947-70E740481C1C}">
+                <a14:useLocalDpi xmlns:a14="http://schemas.microsoft.com/office/drawing/2010/main" val="0"/>
+              </a:ext>
+            </a:extLst>
+          </a:blip>
+          <a:stretch>
+            <a:fillRect/>
+          </a:stretch>
+        </p:blipFill>
+        <p:spPr>
+          <a:xfrm>
+            <a:off x="8349096" y="5045960"/>
+            <a:ext cx="1816239" cy="558211"/>
+          </a:xfrm>
+          <a:prstGeom prst="rect">
+            <a:avLst/>
+          </a:prstGeom>
+        </p:spPr>
+      </p:pic>
+      <p:pic>
+        <p:nvPicPr>
+          <p:cNvPr id="13" name="Graphique 12">
+            <a:extLst>
+              <a:ext uri="{FF2B5EF4-FFF2-40B4-BE49-F238E27FC236}">
+                <a16:creationId xmlns:a16="http://schemas.microsoft.com/office/drawing/2014/main" id="{3FF8A281-87D2-4505-A058-6F160B9E3494}"/>
+              </a:ext>
+            </a:extLst>
+          </p:cNvPr>
+          <p:cNvPicPr>
+            <a:picLocks noChangeAspect="1"/>
+          </p:cNvPicPr>
+          <p:nvPr/>
+        </p:nvPicPr>
+        <p:blipFill>
+          <a:blip r:embed="rId4">
+            <a:extLst>
+              <a:ext uri="{28A0092B-C50C-407E-A947-70E740481C1C}">
+                <a14:useLocalDpi xmlns:a14="http://schemas.microsoft.com/office/drawing/2010/main" val="0"/>
+              </a:ext>
+              <a:ext uri="{96DAC541-7B7A-43D3-8B79-37D633B846F1}">
+                <asvg:svgBlip xmlns:asvg="http://schemas.microsoft.com/office/drawing/2016/SVG/main" r:embed="rId5"/>
+              </a:ext>
+            </a:extLst>
+          </a:blip>
+          <a:stretch>
+            <a:fillRect/>
+          </a:stretch>
+        </p:blipFill>
+        <p:spPr>
+          <a:xfrm>
+            <a:off x="10977170" y="4946610"/>
+            <a:ext cx="945428" cy="928410"/>
+          </a:xfrm>
+          <a:prstGeom prst="rect">
+            <a:avLst/>
+          </a:prstGeom>
+        </p:spPr>
+      </p:pic>
+      <p:pic>
+        <p:nvPicPr>
+          <p:cNvPr id="15" name="Image 14">
+            <a:extLst>
+              <a:ext uri="{FF2B5EF4-FFF2-40B4-BE49-F238E27FC236}">
+                <a16:creationId xmlns:a16="http://schemas.microsoft.com/office/drawing/2014/main" id="{DC80E479-D393-4944-8923-87DC74E964EF}"/>
+              </a:ext>
+            </a:extLst>
+          </p:cNvPr>
+          <p:cNvPicPr>
+            <a:picLocks noChangeAspect="1"/>
+          </p:cNvPicPr>
+          <p:nvPr/>
+        </p:nvPicPr>
+        <p:blipFill>
+          <a:blip r:embed="rId6">
+            <a:extLst>
+              <a:ext uri="{28A0092B-C50C-407E-A947-70E740481C1C}">
+                <a14:useLocalDpi xmlns:a14="http://schemas.microsoft.com/office/drawing/2010/main" val="0"/>
+              </a:ext>
+            </a:extLst>
+          </a:blip>
+          <a:stretch>
+            <a:fillRect/>
+          </a:stretch>
+        </p:blipFill>
+        <p:spPr>
+          <a:xfrm>
+            <a:off x="8425640" y="5709058"/>
+            <a:ext cx="831576" cy="831576"/>
+          </a:xfrm>
+          <a:prstGeom prst="rect">
+            <a:avLst/>
+          </a:prstGeom>
+        </p:spPr>
+      </p:pic>
+      <p:pic>
+        <p:nvPicPr>
+          <p:cNvPr id="17" name="Image 16">
+            <a:extLst>
+              <a:ext uri="{FF2B5EF4-FFF2-40B4-BE49-F238E27FC236}">
+                <a16:creationId xmlns:a16="http://schemas.microsoft.com/office/drawing/2014/main" id="{5C2D300F-23B4-4906-9912-9F5A7029DBB3}"/>
+              </a:ext>
+            </a:extLst>
+          </p:cNvPr>
+          <p:cNvPicPr>
+            <a:picLocks noChangeAspect="1"/>
+          </p:cNvPicPr>
+          <p:nvPr/>
+        </p:nvPicPr>
+        <p:blipFill>
+          <a:blip r:embed="rId7">
+            <a:extLst>
+              <a:ext uri="{28A0092B-C50C-407E-A947-70E740481C1C}">
+                <a14:useLocalDpi xmlns:a14="http://schemas.microsoft.com/office/drawing/2010/main" val="0"/>
+              </a:ext>
+            </a:extLst>
+          </a:blip>
+          <a:stretch>
+            <a:fillRect/>
+          </a:stretch>
+        </p:blipFill>
+        <p:spPr>
+          <a:xfrm>
+            <a:off x="9755886" y="5565274"/>
+            <a:ext cx="1466850" cy="975360"/>
+          </a:xfrm>
+          <a:prstGeom prst="rect">
+            <a:avLst/>
+          </a:prstGeom>
+        </p:spPr>
+      </p:pic>
+      <p:sp>
+        <p:nvSpPr>
+          <p:cNvPr id="18" name="ZoneTexte 17">
+            <a:extLst>
+              <a:ext uri="{FF2B5EF4-FFF2-40B4-BE49-F238E27FC236}">
+                <a16:creationId xmlns:a16="http://schemas.microsoft.com/office/drawing/2014/main" id="{5FCA8B21-A477-499B-B2C5-A9F62591D55F}"/>
+              </a:ext>
+            </a:extLst>
+          </p:cNvPr>
+          <p:cNvSpPr txBox="1"/>
+          <p:nvPr/>
+        </p:nvSpPr>
+        <p:spPr>
+          <a:xfrm>
+            <a:off x="1967874" y="2013291"/>
+            <a:ext cx="2303929" cy="1015663"/>
+          </a:xfrm>
+          <a:prstGeom prst="rect">
+            <a:avLst/>
+          </a:prstGeom>
+          <a:noFill/>
+        </p:spPr>
+        <p:txBody>
+          <a:bodyPr wrap="square" rtlCol="0">
+            <a:spAutoFit/>
+          </a:bodyPr>
+          <a:lstStyle/>
+          <a:p>
+            <a:pPr marL="285750" indent="-285750">
+              <a:buFontTx/>
+              <a:buChar char="-"/>
+            </a:pPr>
+            <a:r>
+              <a:rPr lang="fr-FR" sz="2000" dirty="0">
+                <a:highlight>
+                  <a:srgbClr val="000000"/>
+                </a:highlight>
+              </a:rPr>
+              <a:t>Arme</a:t>
+            </a:r>
+          </a:p>
+          <a:p>
+            <a:pPr marL="285750" indent="-285750">
+              <a:buFontTx/>
+              <a:buChar char="-"/>
+            </a:pPr>
+            <a:r>
+              <a:rPr lang="fr-FR" sz="2000" dirty="0">
+                <a:highlight>
+                  <a:srgbClr val="000000"/>
+                </a:highlight>
+              </a:rPr>
+              <a:t>Heal</a:t>
+            </a:r>
+          </a:p>
+          <a:p>
+            <a:pPr marL="285750" indent="-285750">
+              <a:buFontTx/>
+              <a:buChar char="-"/>
+            </a:pPr>
+            <a:r>
+              <a:rPr lang="fr-FR" sz="2000" dirty="0">
+                <a:highlight>
+                  <a:srgbClr val="000000"/>
+                </a:highlight>
+              </a:rPr>
+              <a:t>Items</a:t>
+            </a:r>
+          </a:p>
+        </p:txBody>
+      </p:sp>
+      <p:sp>
+        <p:nvSpPr>
+          <p:cNvPr id="19" name="ZoneTexte 18">
+            <a:extLst>
+              <a:ext uri="{FF2B5EF4-FFF2-40B4-BE49-F238E27FC236}">
+                <a16:creationId xmlns:a16="http://schemas.microsoft.com/office/drawing/2014/main" id="{25816665-5F30-4AEC-961E-69F90D2A30E4}"/>
+              </a:ext>
+            </a:extLst>
+          </p:cNvPr>
+          <p:cNvSpPr txBox="1"/>
+          <p:nvPr/>
+        </p:nvSpPr>
+        <p:spPr>
+          <a:xfrm>
+            <a:off x="7108750" y="1855694"/>
+            <a:ext cx="2303929" cy="1323439"/>
+          </a:xfrm>
+          <a:prstGeom prst="rect">
+            <a:avLst/>
+          </a:prstGeom>
+          <a:noFill/>
+        </p:spPr>
+        <p:txBody>
+          <a:bodyPr wrap="square" rtlCol="0">
+            <a:spAutoFit/>
+          </a:bodyPr>
+          <a:lstStyle/>
+          <a:p>
+            <a:pPr marL="285750" indent="-285750">
+              <a:buFontTx/>
+              <a:buChar char="-"/>
+            </a:pPr>
+            <a:r>
+              <a:rPr lang="fr-FR" sz="2000" dirty="0">
+                <a:highlight>
+                  <a:srgbClr val="000000"/>
+                </a:highlight>
+              </a:rPr>
+              <a:t>Personnage</a:t>
+            </a:r>
+          </a:p>
+          <a:p>
+            <a:pPr marL="285750" indent="-285750">
+              <a:buFontTx/>
+              <a:buChar char="-"/>
+            </a:pPr>
+            <a:r>
+              <a:rPr lang="fr-FR" sz="2000" dirty="0">
+                <a:highlight>
+                  <a:srgbClr val="000000"/>
+                </a:highlight>
+              </a:rPr>
+              <a:t>Survivant</a:t>
+            </a:r>
+          </a:p>
+          <a:p>
+            <a:pPr marL="285750" indent="-285750">
+              <a:buFontTx/>
+              <a:buChar char="-"/>
+            </a:pPr>
+            <a:r>
+              <a:rPr lang="fr-FR" sz="2000" dirty="0">
+                <a:highlight>
+                  <a:srgbClr val="000000"/>
+                </a:highlight>
+              </a:rPr>
+              <a:t>Zombie</a:t>
+            </a:r>
+          </a:p>
+          <a:p>
+            <a:pPr marL="285750" indent="-285750">
+              <a:buFontTx/>
+              <a:buChar char="-"/>
+            </a:pPr>
+            <a:r>
+              <a:rPr lang="fr-FR" sz="2000" dirty="0">
+                <a:highlight>
+                  <a:srgbClr val="000000"/>
+                </a:highlight>
+              </a:rPr>
+              <a:t>Combat</a:t>
+            </a:r>
+          </a:p>
+        </p:txBody>
+      </p:sp>
+      <p:sp>
+        <p:nvSpPr>
+          <p:cNvPr id="21" name="ZoneTexte 20">
+            <a:extLst>
+              <a:ext uri="{FF2B5EF4-FFF2-40B4-BE49-F238E27FC236}">
+                <a16:creationId xmlns:a16="http://schemas.microsoft.com/office/drawing/2014/main" id="{C3966D48-9982-48A2-8141-B1DA3DD12B24}"/>
+              </a:ext>
+            </a:extLst>
+          </p:cNvPr>
+          <p:cNvSpPr txBox="1"/>
+          <p:nvPr/>
+        </p:nvSpPr>
+        <p:spPr>
+          <a:xfrm>
+            <a:off x="4944033" y="3522255"/>
+            <a:ext cx="2303929" cy="400110"/>
+          </a:xfrm>
+          <a:prstGeom prst="rect">
+            <a:avLst/>
+          </a:prstGeom>
+          <a:noFill/>
+        </p:spPr>
+        <p:txBody>
+          <a:bodyPr wrap="square" rtlCol="0">
+            <a:spAutoFit/>
+          </a:bodyPr>
+          <a:lstStyle/>
+          <a:p>
+            <a:pPr marL="285750" indent="-285750">
+              <a:buFontTx/>
+              <a:buChar char="-"/>
+            </a:pPr>
+            <a:r>
+              <a:rPr lang="fr-FR" sz="2000" dirty="0">
+                <a:highlight>
+                  <a:srgbClr val="000000"/>
+                </a:highlight>
+              </a:rPr>
+              <a:t>App</a:t>
+            </a:r>
+          </a:p>
+        </p:txBody>
+      </p:sp>
+    </p:spTree>
+    <p:extLst>
+      <p:ext uri="{BB962C8B-B14F-4D97-AF65-F5344CB8AC3E}">
+        <p14:creationId xmlns:p14="http://schemas.microsoft.com/office/powerpoint/2010/main" val="2251253992"/>
+      </p:ext>
+    </p:extLst>
+  </p:cSld>
+  <p:clrMapOvr>
+    <a:overrideClrMapping bg1="dk1" tx1="lt1" bg2="dk2" tx2="lt2" accent1="accent1" accent2="accent2" accent3="accent3" accent4="accent4" accent5="accent5" accent6="accent6" hlink="hlink" folHlink="folHlink"/>
+  </p:clrMapOvr>
+  <mc:AlternateContent xmlns:mc="http://schemas.openxmlformats.org/markup-compatibility/2006" xmlns:p159="http://schemas.microsoft.com/office/powerpoint/2015/09/main">
+    <mc:Choice Requires="p159">
+      <p:transition xmlns:p14="http://schemas.microsoft.com/office/powerpoint/2010/main" spd="slow" p14:dur="2000">
+        <p159:morph option="byObject"/>
+      </p:transition>
+    </mc:Choice>
+    <mc:Fallback xmlns="">
+      <p:transition spd="slow">
+        <p:fade/>
+      </p:transition>
+    </mc:Fallback>
+  </mc:AlternateContent>
+</p:sld>
+</file>
+
+<file path=ppt/slides/slide9.xml><?xml version="1.0" encoding="utf-8"?>
+<p:sld xmlns:a="http://schemas.openxmlformats.org/drawingml/2006/main" xmlns:r="http://schemas.openxmlformats.org/officeDocument/2006/relationships" xmlns:p="http://schemas.openxmlformats.org/presentationml/2006/main">
+  <p:cSld>
+    <p:bg>
+      <p:bgPr>
+        <a:solidFill>
+          <a:schemeClr val="bg1"/>
+        </a:solidFill>
+        <a:effectLst/>
+      </p:bgPr>
+    </p:bg>
+    <p:spTree>
+      <p:nvGrpSpPr>
+        <p:cNvPr id="1" name=""/>
+        <p:cNvGrpSpPr/>
+        <p:nvPr/>
+      </p:nvGrpSpPr>
+      <p:grpSpPr>
+        <a:xfrm>
+          <a:off x="0" y="0"/>
+          <a:ext cx="0" cy="0"/>
+          <a:chOff x="0" y="0"/>
+          <a:chExt cx="0" cy="0"/>
+        </a:xfrm>
+      </p:grpSpPr>
+      <p:pic>
+        <p:nvPicPr>
+          <p:cNvPr id="5" name="Espace réservé du contenu 4" descr="Une image contenant extérieur, homme, jeune, tenant&#10;&#10;Description générée automatiquement">
+            <a:extLst>
+              <a:ext uri="{FF2B5EF4-FFF2-40B4-BE49-F238E27FC236}">
+                <a16:creationId xmlns:a16="http://schemas.microsoft.com/office/drawing/2014/main" id="{809E5E4D-631D-4559-B3D3-AB5A183C4CD0}"/>
+              </a:ext>
+            </a:extLst>
+          </p:cNvPr>
+          <p:cNvPicPr>
+            <a:picLocks noGrp="1" noChangeAspect="1"/>
+          </p:cNvPicPr>
+          <p:nvPr>
+            <p:ph idx="1"/>
+          </p:nvPr>
+        </p:nvPicPr>
+        <p:blipFill rotWithShape="1">
+          <a:blip r:embed="rId2">
+            <a:alphaModFix/>
+            <a:extLst>
+              <a:ext uri="{28A0092B-C50C-407E-A947-70E740481C1C}">
+                <a14:useLocalDpi xmlns:a14="http://schemas.microsoft.com/office/drawing/2010/main" val="0"/>
+              </a:ext>
+            </a:extLst>
+          </a:blip>
+          <a:srcRect/>
+          <a:stretch/>
+        </p:blipFill>
+        <p:spPr>
+          <a:xfrm>
+            <a:off x="20" y="0"/>
+            <a:ext cx="12191980" cy="6857990"/>
+          </a:xfrm>
+          <a:prstGeom prst="rect">
+            <a:avLst/>
+          </a:prstGeom>
+        </p:spPr>
+      </p:pic>
+      <p:sp>
+        <p:nvSpPr>
+          <p:cNvPr id="14" name="Rectangle 9">
+            <a:extLst>
+              <a:ext uri="{FF2B5EF4-FFF2-40B4-BE49-F238E27FC236}">
+                <a16:creationId xmlns:a16="http://schemas.microsoft.com/office/drawing/2014/main" id="{D38A241E-0395-41E5-8607-BAA2799A4374}"/>
+              </a:ext>
+              <a:ext uri="{C183D7F6-B498-43B3-948B-1728B52AA6E4}">
+                <adec:decorative xmlns:adec="http://schemas.microsoft.com/office/drawing/2017/decorative" val="1"/>
+              </a:ext>
+            </a:extLst>
+          </p:cNvPr>
+          <p:cNvSpPr>
+            <a:spLocks noGrp="1" noRot="1" noChangeAspect="1" noMove="1" noResize="1" noEditPoints="1" noAdjustHandles="1" noChangeArrowheads="1" noChangeShapeType="1" noTextEdit="1"/>
+          </p:cNvSpPr>
+          <p:nvPr>
+            <p:extLst>
+              <p:ext uri="{386F3935-93C4-4BCD-93E2-E3B085C9AB24}">
+                <p16:designElem xmlns:p16="http://schemas.microsoft.com/office/powerpoint/2015/main" val="1"/>
+              </p:ext>
+            </p:extLst>
+          </p:nvPr>
+        </p:nvSpPr>
+        <p:spPr bwMode="ltGray">
+          <a:xfrm>
+            <a:off x="-1" y="4892040"/>
+            <a:ext cx="12191999" cy="1965960"/>
+          </a:xfrm>
+          <a:prstGeom prst="rect">
+            <a:avLst/>
+          </a:prstGeom>
+          <a:solidFill>
+            <a:schemeClr val="bg1">
+              <a:alpha val="72000"/>
+            </a:schemeClr>
+          </a:solidFill>
+          <a:ln w="127000" cap="sq" cmpd="thinThick">
+            <a:noFill/>
+          </a:ln>
+        </p:spPr>
+        <p:style>
+          <a:lnRef idx="2">
+            <a:schemeClr val="accent1">
+              <a:shade val="50000"/>
+            </a:schemeClr>
+          </a:lnRef>
+          <a:fillRef idx="1">
+            <a:schemeClr val="accent1"/>
+          </a:fillRef>
+          <a:effectRef idx="0">
+            <a:schemeClr val="accent1"/>
+          </a:effectRef>
+          <a:fontRef idx="minor">
+            <a:schemeClr val="lt1"/>
+          </a:fontRef>
+        </p:style>
+        <p:txBody>
+          <a:bodyPr rtlCol="0" anchor="ctr"/>
+          <a:lstStyle/>
+          <a:p>
+            <a:pPr marL="0" marR="0" lvl="0" indent="0" algn="ctr" defTabSz="914400" rtl="0" eaLnBrk="1" fontAlgn="auto" latinLnBrk="0" hangingPunct="1">
+              <a:lnSpc>
+                <a:spcPct val="100000"/>
+              </a:lnSpc>
+              <a:spcBef>
+                <a:spcPts val="0"/>
+              </a:spcBef>
+              <a:spcAft>
+                <a:spcPts val="0"/>
+              </a:spcAft>
+              <a:buClrTx/>
+              <a:buSzTx/>
+              <a:buFontTx/>
+              <a:buNone/>
+              <a:tabLst/>
+              <a:defRPr/>
+            </a:pPr>
+            <a:endParaRPr kumimoji="0" lang="en-US" sz="1800" b="0" i="0" u="none" strike="noStrike" kern="1200" cap="none" spc="0" normalizeH="0" baseline="0" noProof="0">
+              <a:ln>
+                <a:noFill/>
+              </a:ln>
+              <a:solidFill>
+                <a:prstClr val="white"/>
+              </a:solidFill>
+              <a:effectLst/>
+              <a:uLnTx/>
+              <a:uFillTx/>
+              <a:latin typeface="Calibri" panose="020F0502020204030204"/>
+              <a:ea typeface="+mn-ea"/>
+              <a:cs typeface="+mn-cs"/>
+            </a:endParaRPr>
+          </a:p>
+        </p:txBody>
+      </p:sp>
+      <p:sp>
+        <p:nvSpPr>
+          <p:cNvPr id="2" name="Titre 1">
+            <a:extLst>
+              <a:ext uri="{FF2B5EF4-FFF2-40B4-BE49-F238E27FC236}">
+                <a16:creationId xmlns:a16="http://schemas.microsoft.com/office/drawing/2014/main" id="{07AE0670-618A-48C2-A04C-2C1D54DAC7FD}"/>
+              </a:ext>
+            </a:extLst>
+          </p:cNvPr>
+          <p:cNvSpPr>
+            <a:spLocks noGrp="1"/>
+          </p:cNvSpPr>
+          <p:nvPr>
+            <p:ph type="title"/>
+          </p:nvPr>
+        </p:nvSpPr>
+        <p:spPr>
+          <a:xfrm>
+            <a:off x="969264" y="5154168"/>
+            <a:ext cx="6973204" cy="1261872"/>
+          </a:xfrm>
+        </p:spPr>
+        <p:txBody>
+          <a:bodyPr vert="horz" lIns="91440" tIns="45720" rIns="91440" bIns="45720" rtlCol="0" anchor="ctr">
+            <a:normAutofit/>
+          </a:bodyPr>
+          <a:lstStyle/>
+          <a:p>
+            <a:pPr algn="ctr"/>
+            <a:r>
+              <a:rPr lang="en-US" sz="4800" dirty="0">
+                <a:solidFill>
+                  <a:schemeClr val="tx1">
+                    <a:lumMod val="85000"/>
+                    <a:lumOff val="15000"/>
+                  </a:schemeClr>
+                </a:solidFill>
+              </a:rPr>
+              <a:t>Fin </a:t>
+            </a:r>
+          </a:p>
+        </p:txBody>
+      </p:sp>
+      <p:cxnSp>
+        <p:nvCxnSpPr>
+          <p:cNvPr id="15" name="Straight Connector 11">
+            <a:extLst>
+              <a:ext uri="{FF2B5EF4-FFF2-40B4-BE49-F238E27FC236}">
+                <a16:creationId xmlns:a16="http://schemas.microsoft.com/office/drawing/2014/main" id="{CE352288-84AD-4CA8-BCD5-76C29D34E1DB}"/>
+              </a:ext>
+              <a:ext uri="{C183D7F6-B498-43B3-948B-1728B52AA6E4}">
+                <adec:decorative xmlns:adec="http://schemas.microsoft.com/office/drawing/2017/decorative" val="1"/>
+              </a:ext>
+            </a:extLst>
+          </p:cNvPr>
+          <p:cNvCxnSpPr>
+            <a:cxnSpLocks noGrp="1" noRot="1" noChangeAspect="1" noMove="1" noResize="1" noEditPoints="1" noAdjustHandles="1" noChangeArrowheads="1" noChangeShapeType="1"/>
+          </p:cNvCxnSpPr>
+          <p:nvPr>
+            <p:extLst>
+              <p:ext uri="{386F3935-93C4-4BCD-93E2-E3B085C9AB24}">
+                <p16:designElem xmlns:p16="http://schemas.microsoft.com/office/powerpoint/2015/main" val="1"/>
+              </p:ext>
+            </p:extLst>
+          </p:nvPr>
+        </p:nvCxnSpPr>
+        <p:spPr>
+          <a:xfrm flipV="1">
+            <a:off x="8138160" y="5325066"/>
+            <a:ext cx="0" cy="914400"/>
+          </a:xfrm>
+          <a:prstGeom prst="line">
+            <a:avLst/>
+          </a:prstGeom>
+          <a:ln w="19050">
+            <a:solidFill>
+              <a:schemeClr val="tx1">
+                <a:lumMod val="85000"/>
+                <a:lumOff val="15000"/>
+              </a:schemeClr>
+            </a:solidFill>
+          </a:ln>
+        </p:spPr>
+        <p:style>
+          <a:lnRef idx="1">
+            <a:schemeClr val="accent1"/>
+          </a:lnRef>
+          <a:fillRef idx="0">
+            <a:schemeClr val="accent1"/>
+          </a:fillRef>
+          <a:effectRef idx="0">
+            <a:schemeClr val="accent1"/>
+          </a:effectRef>
+          <a:fontRef idx="minor">
+            <a:schemeClr val="tx1"/>
+          </a:fontRef>
+        </p:style>
+      </p:cxnSp>
       <p:sp>
         <p:nvSpPr>
           <p:cNvPr id="6" name="ZoneTexte 5">
@@ -5356,6 +7298,18 @@
   <p:clrMapOvr>
     <a:overrideClrMapping bg1="dk1" tx1="lt1" bg2="dk2" tx2="lt2" accent1="accent1" accent2="accent2" accent3="accent3" accent4="accent4" accent5="accent5" accent6="accent6" hlink="hlink" folHlink="folHlink"/>
   </p:clrMapOvr>
+  <mc:AlternateContent xmlns:mc="http://schemas.openxmlformats.org/markup-compatibility/2006" xmlns:p14="http://schemas.microsoft.com/office/powerpoint/2010/main">
+    <mc:Choice Requires="p14">
+      <p:transition spd="med" p14:dur="700">
+        <p:fade/>
+      </p:transition>
+    </mc:Choice>
+    <mc:Fallback xmlns="">
+      <p:transition spd="med">
+        <p:fade/>
+      </p:transition>
+    </mc:Fallback>
+  </mc:AlternateContent>
 </p:sld>
 </file>
 

</xml_diff>